<commit_message>
Edit intro change motivation from slack.
</commit_message>
<xml_diff>
--- a/figs_src/diagrams-wide.pptx
+++ b/figs_src/diagrams-wide.pptx
@@ -8,6 +8,8 @@
     <p:sldId id="270" r:id="rId2"/>
     <p:sldId id="271" r:id="rId3"/>
     <p:sldId id="272" r:id="rId4"/>
+    <p:sldId id="273" r:id="rId5"/>
+    <p:sldId id="274" r:id="rId6"/>
   </p:sldIdLst>
   <p:sldSz cx="5303838" cy="10058400"/>
   <p:notesSz cx="4845050" cy="9601200"/>
@@ -290,7 +292,7 @@
           <a:p>
             <a:fld id="{D9DE92D4-3454-4E80-9822-1258D18FA6E8}" type="datetimeFigureOut">
               <a:rPr lang="en-US" smtClean="0"/>
-              <a:t>7/12/2015</a:t>
+              <a:t>7/23/2015</a:t>
             </a:fld>
             <a:endParaRPr lang="en-US"/>
           </a:p>
@@ -460,7 +462,7 @@
           <a:p>
             <a:fld id="{D9DE92D4-3454-4E80-9822-1258D18FA6E8}" type="datetimeFigureOut">
               <a:rPr lang="en-US" smtClean="0"/>
-              <a:t>7/12/2015</a:t>
+              <a:t>7/23/2015</a:t>
             </a:fld>
             <a:endParaRPr lang="en-US"/>
           </a:p>
@@ -640,7 +642,7 @@
           <a:p>
             <a:fld id="{D9DE92D4-3454-4E80-9822-1258D18FA6E8}" type="datetimeFigureOut">
               <a:rPr lang="en-US" smtClean="0"/>
-              <a:t>7/12/2015</a:t>
+              <a:t>7/23/2015</a:t>
             </a:fld>
             <a:endParaRPr lang="en-US"/>
           </a:p>
@@ -810,7 +812,7 @@
           <a:p>
             <a:fld id="{D9DE92D4-3454-4E80-9822-1258D18FA6E8}" type="datetimeFigureOut">
               <a:rPr lang="en-US" smtClean="0"/>
-              <a:t>7/12/2015</a:t>
+              <a:t>7/23/2015</a:t>
             </a:fld>
             <a:endParaRPr lang="en-US"/>
           </a:p>
@@ -1056,7 +1058,7 @@
           <a:p>
             <a:fld id="{D9DE92D4-3454-4E80-9822-1258D18FA6E8}" type="datetimeFigureOut">
               <a:rPr lang="en-US" smtClean="0"/>
-              <a:t>7/12/2015</a:t>
+              <a:t>7/23/2015</a:t>
             </a:fld>
             <a:endParaRPr lang="en-US"/>
           </a:p>
@@ -1344,7 +1346,7 @@
           <a:p>
             <a:fld id="{D9DE92D4-3454-4E80-9822-1258D18FA6E8}" type="datetimeFigureOut">
               <a:rPr lang="en-US" smtClean="0"/>
-              <a:t>7/12/2015</a:t>
+              <a:t>7/23/2015</a:t>
             </a:fld>
             <a:endParaRPr lang="en-US"/>
           </a:p>
@@ -1771,7 +1773,7 @@
           <a:p>
             <a:fld id="{D9DE92D4-3454-4E80-9822-1258D18FA6E8}" type="datetimeFigureOut">
               <a:rPr lang="en-US" smtClean="0"/>
-              <a:t>7/12/2015</a:t>
+              <a:t>7/23/2015</a:t>
             </a:fld>
             <a:endParaRPr lang="en-US"/>
           </a:p>
@@ -1889,7 +1891,7 @@
           <a:p>
             <a:fld id="{D9DE92D4-3454-4E80-9822-1258D18FA6E8}" type="datetimeFigureOut">
               <a:rPr lang="en-US" smtClean="0"/>
-              <a:t>7/12/2015</a:t>
+              <a:t>7/23/2015</a:t>
             </a:fld>
             <a:endParaRPr lang="en-US"/>
           </a:p>
@@ -1984,7 +1986,7 @@
           <a:p>
             <a:fld id="{D9DE92D4-3454-4E80-9822-1258D18FA6E8}" type="datetimeFigureOut">
               <a:rPr lang="en-US" smtClean="0"/>
-              <a:t>7/12/2015</a:t>
+              <a:t>7/23/2015</a:t>
             </a:fld>
             <a:endParaRPr lang="en-US"/>
           </a:p>
@@ -2261,7 +2263,7 @@
           <a:p>
             <a:fld id="{D9DE92D4-3454-4E80-9822-1258D18FA6E8}" type="datetimeFigureOut">
               <a:rPr lang="en-US" smtClean="0"/>
-              <a:t>7/12/2015</a:t>
+              <a:t>7/23/2015</a:t>
             </a:fld>
             <a:endParaRPr lang="en-US"/>
           </a:p>
@@ -2514,7 +2516,7 @@
           <a:p>
             <a:fld id="{D9DE92D4-3454-4E80-9822-1258D18FA6E8}" type="datetimeFigureOut">
               <a:rPr lang="en-US" smtClean="0"/>
-              <a:t>7/12/2015</a:t>
+              <a:t>7/23/2015</a:t>
             </a:fld>
             <a:endParaRPr lang="en-US"/>
           </a:p>
@@ -2727,7 +2729,7 @@
           <a:p>
             <a:fld id="{D9DE92D4-3454-4E80-9822-1258D18FA6E8}" type="datetimeFigureOut">
               <a:rPr lang="en-US" smtClean="0"/>
-              <a:t>7/12/2015</a:t>
+              <a:t>7/23/2015</a:t>
             </a:fld>
             <a:endParaRPr lang="en-US"/>
           </a:p>
@@ -6377,6 +6379,2000 @@
     <p:extLst>
       <p:ext uri="{BB962C8B-B14F-4D97-AF65-F5344CB8AC3E}">
         <p14:creationId xmlns:p14="http://schemas.microsoft.com/office/powerpoint/2010/main" val="4129890357"/>
+      </p:ext>
+    </p:extLst>
+  </p:cSld>
+  <p:clrMapOvr>
+    <a:masterClrMapping/>
+  </p:clrMapOvr>
+</p:sld>
+</file>
+
+<file path=ppt/slides/slide4.xml><?xml version="1.0" encoding="utf-8"?>
+<p:sld xmlns:a="http://schemas.openxmlformats.org/drawingml/2006/main" xmlns:r="http://schemas.openxmlformats.org/officeDocument/2006/relationships" xmlns:p="http://schemas.openxmlformats.org/presentationml/2006/main">
+  <p:cSld>
+    <p:spTree>
+      <p:nvGrpSpPr>
+        <p:cNvPr id="1" name=""/>
+        <p:cNvGrpSpPr/>
+        <p:nvPr/>
+      </p:nvGrpSpPr>
+      <p:grpSpPr>
+        <a:xfrm>
+          <a:off x="0" y="0"/>
+          <a:ext cx="0" cy="0"/>
+          <a:chOff x="0" y="0"/>
+          <a:chExt cx="0" cy="0"/>
+        </a:xfrm>
+      </p:grpSpPr>
+      <p:sp>
+        <p:nvSpPr>
+          <p:cNvPr id="2" name="Rounded Rectangle 1"/>
+          <p:cNvSpPr/>
+          <p:nvPr/>
+        </p:nvSpPr>
+        <p:spPr>
+          <a:xfrm>
+            <a:off x="1051719" y="76200"/>
+            <a:ext cx="1676400" cy="2438400"/>
+          </a:xfrm>
+          <a:prstGeom prst="roundRect">
+            <a:avLst>
+              <a:gd name="adj" fmla="val 5365"/>
+            </a:avLst>
+          </a:prstGeom>
+          <a:noFill/>
+          <a:ln w="12700">
+            <a:solidFill>
+              <a:schemeClr val="tx1"/>
+            </a:solidFill>
+          </a:ln>
+        </p:spPr>
+        <p:style>
+          <a:lnRef idx="2">
+            <a:schemeClr val="accent1">
+              <a:shade val="50000"/>
+            </a:schemeClr>
+          </a:lnRef>
+          <a:fillRef idx="1">
+            <a:schemeClr val="accent1"/>
+          </a:fillRef>
+          <a:effectRef idx="0">
+            <a:schemeClr val="accent1"/>
+          </a:effectRef>
+          <a:fontRef idx="minor">
+            <a:schemeClr val="lt1"/>
+          </a:fontRef>
+        </p:style>
+        <p:txBody>
+          <a:bodyPr rtlCol="0" anchor="ctr"/>
+          <a:lstStyle/>
+          <a:p>
+            <a:pPr algn="ctr"/>
+            <a:endParaRPr lang="en-US" sz="800" dirty="0">
+              <a:solidFill>
+                <a:schemeClr val="tx1"/>
+              </a:solidFill>
+              <a:latin typeface="Arial" pitchFamily="34" charset="0"/>
+              <a:cs typeface="Arial" pitchFamily="34" charset="0"/>
+            </a:endParaRPr>
+          </a:p>
+        </p:txBody>
+      </p:sp>
+      <p:sp>
+        <p:nvSpPr>
+          <p:cNvPr id="3" name="TextBox 2"/>
+          <p:cNvSpPr txBox="1"/>
+          <p:nvPr/>
+        </p:nvSpPr>
+        <p:spPr>
+          <a:xfrm>
+            <a:off x="1051719" y="76200"/>
+            <a:ext cx="1676400" cy="215444"/>
+          </a:xfrm>
+          <a:prstGeom prst="rect">
+            <a:avLst/>
+          </a:prstGeom>
+          <a:noFill/>
+          <a:ln w="12700">
+            <a:noFill/>
+          </a:ln>
+        </p:spPr>
+        <p:style>
+          <a:lnRef idx="2">
+            <a:schemeClr val="accent1">
+              <a:shade val="50000"/>
+            </a:schemeClr>
+          </a:lnRef>
+          <a:fillRef idx="1">
+            <a:schemeClr val="accent1"/>
+          </a:fillRef>
+          <a:effectRef idx="0">
+            <a:schemeClr val="accent1"/>
+          </a:effectRef>
+          <a:fontRef idx="minor">
+            <a:schemeClr val="lt1"/>
+          </a:fontRef>
+        </p:style>
+        <p:txBody>
+          <a:bodyPr rtlCol="0" anchor="ctr"/>
+          <a:lstStyle>
+            <a:defPPr>
+              <a:defRPr lang="en-US"/>
+            </a:defPPr>
+            <a:lvl1pPr algn="r">
+              <a:defRPr sz="800">
+                <a:latin typeface="Arial" pitchFamily="34" charset="0"/>
+                <a:cs typeface="Arial" pitchFamily="34" charset="0"/>
+              </a:defRPr>
+            </a:lvl1pPr>
+            <a:lvl2pPr>
+              <a:defRPr>
+                <a:solidFill>
+                  <a:schemeClr val="lt1"/>
+                </a:solidFill>
+              </a:defRPr>
+            </a:lvl2pPr>
+            <a:lvl3pPr>
+              <a:defRPr>
+                <a:solidFill>
+                  <a:schemeClr val="lt1"/>
+                </a:solidFill>
+              </a:defRPr>
+            </a:lvl3pPr>
+            <a:lvl4pPr>
+              <a:defRPr>
+                <a:solidFill>
+                  <a:schemeClr val="lt1"/>
+                </a:solidFill>
+              </a:defRPr>
+            </a:lvl4pPr>
+            <a:lvl5pPr>
+              <a:defRPr>
+                <a:solidFill>
+                  <a:schemeClr val="lt1"/>
+                </a:solidFill>
+              </a:defRPr>
+            </a:lvl5pPr>
+            <a:lvl6pPr>
+              <a:defRPr>
+                <a:solidFill>
+                  <a:schemeClr val="lt1"/>
+                </a:solidFill>
+              </a:defRPr>
+            </a:lvl6pPr>
+            <a:lvl7pPr>
+              <a:defRPr>
+                <a:solidFill>
+                  <a:schemeClr val="lt1"/>
+                </a:solidFill>
+              </a:defRPr>
+            </a:lvl7pPr>
+            <a:lvl8pPr>
+              <a:defRPr>
+                <a:solidFill>
+                  <a:schemeClr val="lt1"/>
+                </a:solidFill>
+              </a:defRPr>
+            </a:lvl8pPr>
+            <a:lvl9pPr>
+              <a:defRPr>
+                <a:solidFill>
+                  <a:schemeClr val="lt1"/>
+                </a:solidFill>
+              </a:defRPr>
+            </a:lvl9pPr>
+          </a:lstStyle>
+          <a:p>
+            <a:pPr algn="ctr"/>
+            <a:r>
+              <a:rPr lang="en-US" dirty="0">
+                <a:solidFill>
+                  <a:schemeClr val="tx1"/>
+                </a:solidFill>
+              </a:rPr>
+              <a:t>Security &amp; Reliability</a:t>
+            </a:r>
+          </a:p>
+        </p:txBody>
+      </p:sp>
+      <p:sp>
+        <p:nvSpPr>
+          <p:cNvPr id="6" name="Rounded Rectangle 5"/>
+          <p:cNvSpPr/>
+          <p:nvPr/>
+        </p:nvSpPr>
+        <p:spPr>
+          <a:xfrm>
+            <a:off x="2880519" y="76200"/>
+            <a:ext cx="1676400" cy="2438400"/>
+          </a:xfrm>
+          <a:prstGeom prst="roundRect">
+            <a:avLst>
+              <a:gd name="adj" fmla="val 5365"/>
+            </a:avLst>
+          </a:prstGeom>
+          <a:noFill/>
+          <a:ln w="12700">
+            <a:solidFill>
+              <a:schemeClr val="tx1"/>
+            </a:solidFill>
+          </a:ln>
+        </p:spPr>
+        <p:style>
+          <a:lnRef idx="2">
+            <a:schemeClr val="accent1">
+              <a:shade val="50000"/>
+            </a:schemeClr>
+          </a:lnRef>
+          <a:fillRef idx="1">
+            <a:schemeClr val="accent1"/>
+          </a:fillRef>
+          <a:effectRef idx="0">
+            <a:schemeClr val="accent1"/>
+          </a:effectRef>
+          <a:fontRef idx="minor">
+            <a:schemeClr val="lt1"/>
+          </a:fontRef>
+        </p:style>
+        <p:txBody>
+          <a:bodyPr rtlCol="0" anchor="ctr"/>
+          <a:lstStyle/>
+          <a:p>
+            <a:pPr algn="ctr"/>
+            <a:endParaRPr lang="en-US" sz="800" dirty="0">
+              <a:solidFill>
+                <a:schemeClr val="tx1"/>
+              </a:solidFill>
+              <a:latin typeface="Arial" pitchFamily="34" charset="0"/>
+              <a:cs typeface="Arial" pitchFamily="34" charset="0"/>
+            </a:endParaRPr>
+          </a:p>
+        </p:txBody>
+      </p:sp>
+      <p:sp>
+        <p:nvSpPr>
+          <p:cNvPr id="7" name="TextBox 6"/>
+          <p:cNvSpPr txBox="1"/>
+          <p:nvPr/>
+        </p:nvSpPr>
+        <p:spPr>
+          <a:xfrm>
+            <a:off x="2880519" y="76200"/>
+            <a:ext cx="1676400" cy="215444"/>
+          </a:xfrm>
+          <a:prstGeom prst="rect">
+            <a:avLst/>
+          </a:prstGeom>
+          <a:noFill/>
+          <a:ln w="12700">
+            <a:noFill/>
+          </a:ln>
+        </p:spPr>
+        <p:style>
+          <a:lnRef idx="2">
+            <a:schemeClr val="accent1">
+              <a:shade val="50000"/>
+            </a:schemeClr>
+          </a:lnRef>
+          <a:fillRef idx="1">
+            <a:schemeClr val="accent1"/>
+          </a:fillRef>
+          <a:effectRef idx="0">
+            <a:schemeClr val="accent1"/>
+          </a:effectRef>
+          <a:fontRef idx="minor">
+            <a:schemeClr val="lt1"/>
+          </a:fontRef>
+        </p:style>
+        <p:txBody>
+          <a:bodyPr rtlCol="0" anchor="ctr"/>
+          <a:lstStyle>
+            <a:defPPr>
+              <a:defRPr lang="en-US"/>
+            </a:defPPr>
+            <a:lvl1pPr algn="r">
+              <a:defRPr sz="800">
+                <a:latin typeface="Arial" pitchFamily="34" charset="0"/>
+                <a:cs typeface="Arial" pitchFamily="34" charset="0"/>
+              </a:defRPr>
+            </a:lvl1pPr>
+            <a:lvl2pPr>
+              <a:defRPr>
+                <a:solidFill>
+                  <a:schemeClr val="lt1"/>
+                </a:solidFill>
+              </a:defRPr>
+            </a:lvl2pPr>
+            <a:lvl3pPr>
+              <a:defRPr>
+                <a:solidFill>
+                  <a:schemeClr val="lt1"/>
+                </a:solidFill>
+              </a:defRPr>
+            </a:lvl3pPr>
+            <a:lvl4pPr>
+              <a:defRPr>
+                <a:solidFill>
+                  <a:schemeClr val="lt1"/>
+                </a:solidFill>
+              </a:defRPr>
+            </a:lvl4pPr>
+            <a:lvl5pPr>
+              <a:defRPr>
+                <a:solidFill>
+                  <a:schemeClr val="lt1"/>
+                </a:solidFill>
+              </a:defRPr>
+            </a:lvl5pPr>
+            <a:lvl6pPr>
+              <a:defRPr>
+                <a:solidFill>
+                  <a:schemeClr val="lt1"/>
+                </a:solidFill>
+              </a:defRPr>
+            </a:lvl6pPr>
+            <a:lvl7pPr>
+              <a:defRPr>
+                <a:solidFill>
+                  <a:schemeClr val="lt1"/>
+                </a:solidFill>
+              </a:defRPr>
+            </a:lvl7pPr>
+            <a:lvl8pPr>
+              <a:defRPr>
+                <a:solidFill>
+                  <a:schemeClr val="lt1"/>
+                </a:solidFill>
+              </a:defRPr>
+            </a:lvl8pPr>
+            <a:lvl9pPr>
+              <a:defRPr>
+                <a:solidFill>
+                  <a:schemeClr val="lt1"/>
+                </a:solidFill>
+              </a:defRPr>
+            </a:lvl9pPr>
+          </a:lstStyle>
+          <a:p>
+            <a:pPr algn="ctr"/>
+            <a:r>
+              <a:rPr lang="en-US" dirty="0" smtClean="0">
+                <a:solidFill>
+                  <a:schemeClr val="tx1"/>
+                </a:solidFill>
+              </a:rPr>
+              <a:t>Energy Efficiency</a:t>
+            </a:r>
+            <a:endParaRPr lang="en-US" dirty="0">
+              <a:solidFill>
+                <a:schemeClr val="tx1"/>
+              </a:solidFill>
+            </a:endParaRPr>
+          </a:p>
+        </p:txBody>
+      </p:sp>
+      <p:sp>
+        <p:nvSpPr>
+          <p:cNvPr id="8" name="Rounded Rectangle 7"/>
+          <p:cNvSpPr/>
+          <p:nvPr/>
+        </p:nvSpPr>
+        <p:spPr>
+          <a:xfrm>
+            <a:off x="594519" y="291644"/>
+            <a:ext cx="4038600" cy="1003756"/>
+          </a:xfrm>
+          <a:prstGeom prst="roundRect">
+            <a:avLst>
+              <a:gd name="adj" fmla="val 7547"/>
+            </a:avLst>
+          </a:prstGeom>
+          <a:noFill/>
+          <a:ln w="12700">
+            <a:solidFill>
+              <a:schemeClr val="tx1"/>
+            </a:solidFill>
+          </a:ln>
+        </p:spPr>
+        <p:style>
+          <a:lnRef idx="2">
+            <a:schemeClr val="accent1">
+              <a:shade val="50000"/>
+            </a:schemeClr>
+          </a:lnRef>
+          <a:fillRef idx="1">
+            <a:schemeClr val="accent1"/>
+          </a:fillRef>
+          <a:effectRef idx="0">
+            <a:schemeClr val="accent1"/>
+          </a:effectRef>
+          <a:fontRef idx="minor">
+            <a:schemeClr val="lt1"/>
+          </a:fontRef>
+        </p:style>
+        <p:txBody>
+          <a:bodyPr rtlCol="0" anchor="ctr"/>
+          <a:lstStyle/>
+          <a:p>
+            <a:pPr algn="ctr"/>
+            <a:endParaRPr lang="en-US" sz="800" dirty="0">
+              <a:solidFill>
+                <a:schemeClr val="tx1"/>
+              </a:solidFill>
+              <a:latin typeface="Arial" pitchFamily="34" charset="0"/>
+              <a:cs typeface="Arial" pitchFamily="34" charset="0"/>
+            </a:endParaRPr>
+          </a:p>
+        </p:txBody>
+      </p:sp>
+      <p:sp>
+        <p:nvSpPr>
+          <p:cNvPr id="9" name="TextBox 8"/>
+          <p:cNvSpPr txBox="1"/>
+          <p:nvPr/>
+        </p:nvSpPr>
+        <p:spPr>
+          <a:xfrm rot="16200000">
+            <a:off x="242377" y="643786"/>
+            <a:ext cx="1003756" cy="299472"/>
+          </a:xfrm>
+          <a:prstGeom prst="rect">
+            <a:avLst/>
+          </a:prstGeom>
+          <a:noFill/>
+          <a:ln w="12700">
+            <a:noFill/>
+          </a:ln>
+        </p:spPr>
+        <p:style>
+          <a:lnRef idx="2">
+            <a:schemeClr val="accent1">
+              <a:shade val="50000"/>
+            </a:schemeClr>
+          </a:lnRef>
+          <a:fillRef idx="1">
+            <a:schemeClr val="accent1"/>
+          </a:fillRef>
+          <a:effectRef idx="0">
+            <a:schemeClr val="accent1"/>
+          </a:effectRef>
+          <a:fontRef idx="minor">
+            <a:schemeClr val="lt1"/>
+          </a:fontRef>
+        </p:style>
+        <p:txBody>
+          <a:bodyPr rtlCol="0" anchor="ctr"/>
+          <a:lstStyle>
+            <a:defPPr>
+              <a:defRPr lang="en-US"/>
+            </a:defPPr>
+            <a:lvl1pPr algn="r">
+              <a:defRPr sz="800">
+                <a:latin typeface="Arial" pitchFamily="34" charset="0"/>
+                <a:cs typeface="Arial" pitchFamily="34" charset="0"/>
+              </a:defRPr>
+            </a:lvl1pPr>
+            <a:lvl2pPr>
+              <a:defRPr>
+                <a:solidFill>
+                  <a:schemeClr val="lt1"/>
+                </a:solidFill>
+              </a:defRPr>
+            </a:lvl2pPr>
+            <a:lvl3pPr>
+              <a:defRPr>
+                <a:solidFill>
+                  <a:schemeClr val="lt1"/>
+                </a:solidFill>
+              </a:defRPr>
+            </a:lvl3pPr>
+            <a:lvl4pPr>
+              <a:defRPr>
+                <a:solidFill>
+                  <a:schemeClr val="lt1"/>
+                </a:solidFill>
+              </a:defRPr>
+            </a:lvl4pPr>
+            <a:lvl5pPr>
+              <a:defRPr>
+                <a:solidFill>
+                  <a:schemeClr val="lt1"/>
+                </a:solidFill>
+              </a:defRPr>
+            </a:lvl5pPr>
+            <a:lvl6pPr>
+              <a:defRPr>
+                <a:solidFill>
+                  <a:schemeClr val="lt1"/>
+                </a:solidFill>
+              </a:defRPr>
+            </a:lvl6pPr>
+            <a:lvl7pPr>
+              <a:defRPr>
+                <a:solidFill>
+                  <a:schemeClr val="lt1"/>
+                </a:solidFill>
+              </a:defRPr>
+            </a:lvl7pPr>
+            <a:lvl8pPr>
+              <a:defRPr>
+                <a:solidFill>
+                  <a:schemeClr val="lt1"/>
+                </a:solidFill>
+              </a:defRPr>
+            </a:lvl8pPr>
+            <a:lvl9pPr>
+              <a:defRPr>
+                <a:solidFill>
+                  <a:schemeClr val="lt1"/>
+                </a:solidFill>
+              </a:defRPr>
+            </a:lvl9pPr>
+          </a:lstStyle>
+          <a:p>
+            <a:pPr algn="ctr"/>
+            <a:r>
+              <a:rPr lang="en-US" dirty="0" smtClean="0">
+                <a:solidFill>
+                  <a:schemeClr val="tx1"/>
+                </a:solidFill>
+              </a:rPr>
+              <a:t>Hard Real-Time Systems</a:t>
+            </a:r>
+            <a:endParaRPr lang="en-US" dirty="0">
+              <a:solidFill>
+                <a:schemeClr val="tx1"/>
+              </a:solidFill>
+            </a:endParaRPr>
+          </a:p>
+        </p:txBody>
+      </p:sp>
+      <p:sp>
+        <p:nvSpPr>
+          <p:cNvPr id="11" name="TextBox 10"/>
+          <p:cNvSpPr txBox="1"/>
+          <p:nvPr/>
+        </p:nvSpPr>
+        <p:spPr>
+          <a:xfrm rot="16200000">
+            <a:off x="242380" y="1786785"/>
+            <a:ext cx="1003756" cy="299474"/>
+          </a:xfrm>
+          <a:prstGeom prst="rect">
+            <a:avLst/>
+          </a:prstGeom>
+          <a:noFill/>
+          <a:ln w="12700">
+            <a:noFill/>
+          </a:ln>
+        </p:spPr>
+        <p:style>
+          <a:lnRef idx="2">
+            <a:schemeClr val="accent1">
+              <a:shade val="50000"/>
+            </a:schemeClr>
+          </a:lnRef>
+          <a:fillRef idx="1">
+            <a:schemeClr val="accent1"/>
+          </a:fillRef>
+          <a:effectRef idx="0">
+            <a:schemeClr val="accent1"/>
+          </a:effectRef>
+          <a:fontRef idx="minor">
+            <a:schemeClr val="lt1"/>
+          </a:fontRef>
+        </p:style>
+        <p:txBody>
+          <a:bodyPr rtlCol="0" anchor="ctr"/>
+          <a:lstStyle>
+            <a:defPPr>
+              <a:defRPr lang="en-US"/>
+            </a:defPPr>
+            <a:lvl1pPr algn="r">
+              <a:defRPr sz="800">
+                <a:latin typeface="Arial" pitchFamily="34" charset="0"/>
+                <a:cs typeface="Arial" pitchFamily="34" charset="0"/>
+              </a:defRPr>
+            </a:lvl1pPr>
+            <a:lvl2pPr>
+              <a:defRPr>
+                <a:solidFill>
+                  <a:schemeClr val="lt1"/>
+                </a:solidFill>
+              </a:defRPr>
+            </a:lvl2pPr>
+            <a:lvl3pPr>
+              <a:defRPr>
+                <a:solidFill>
+                  <a:schemeClr val="lt1"/>
+                </a:solidFill>
+              </a:defRPr>
+            </a:lvl3pPr>
+            <a:lvl4pPr>
+              <a:defRPr>
+                <a:solidFill>
+                  <a:schemeClr val="lt1"/>
+                </a:solidFill>
+              </a:defRPr>
+            </a:lvl4pPr>
+            <a:lvl5pPr>
+              <a:defRPr>
+                <a:solidFill>
+                  <a:schemeClr val="lt1"/>
+                </a:solidFill>
+              </a:defRPr>
+            </a:lvl5pPr>
+            <a:lvl6pPr>
+              <a:defRPr>
+                <a:solidFill>
+                  <a:schemeClr val="lt1"/>
+                </a:solidFill>
+              </a:defRPr>
+            </a:lvl6pPr>
+            <a:lvl7pPr>
+              <a:defRPr>
+                <a:solidFill>
+                  <a:schemeClr val="lt1"/>
+                </a:solidFill>
+              </a:defRPr>
+            </a:lvl7pPr>
+            <a:lvl8pPr>
+              <a:defRPr>
+                <a:solidFill>
+                  <a:schemeClr val="lt1"/>
+                </a:solidFill>
+              </a:defRPr>
+            </a:lvl8pPr>
+            <a:lvl9pPr>
+              <a:defRPr>
+                <a:solidFill>
+                  <a:schemeClr val="lt1"/>
+                </a:solidFill>
+              </a:defRPr>
+            </a:lvl9pPr>
+          </a:lstStyle>
+          <a:p>
+            <a:pPr algn="ctr"/>
+            <a:r>
+              <a:rPr lang="en-US" dirty="0" smtClean="0">
+                <a:solidFill>
+                  <a:schemeClr val="tx1"/>
+                </a:solidFill>
+              </a:rPr>
+              <a:t>Soft Real-Time Systems</a:t>
+            </a:r>
+            <a:endParaRPr lang="en-US" dirty="0">
+              <a:solidFill>
+                <a:schemeClr val="tx1"/>
+              </a:solidFill>
+            </a:endParaRPr>
+          </a:p>
+        </p:txBody>
+      </p:sp>
+      <p:sp>
+        <p:nvSpPr>
+          <p:cNvPr id="12" name="TextBox 11"/>
+          <p:cNvSpPr txBox="1"/>
+          <p:nvPr/>
+        </p:nvSpPr>
+        <p:spPr>
+          <a:xfrm>
+            <a:off x="1166016" y="386893"/>
+            <a:ext cx="1433011" cy="381000"/>
+          </a:xfrm>
+          <a:prstGeom prst="rect">
+            <a:avLst/>
+          </a:prstGeom>
+          <a:solidFill>
+            <a:srgbClr val="FFFFCC"/>
+          </a:solidFill>
+          <a:ln w="12700">
+            <a:solidFill>
+              <a:schemeClr val="tx1"/>
+            </a:solidFill>
+          </a:ln>
+        </p:spPr>
+        <p:style>
+          <a:lnRef idx="2">
+            <a:schemeClr val="accent1">
+              <a:shade val="50000"/>
+            </a:schemeClr>
+          </a:lnRef>
+          <a:fillRef idx="1">
+            <a:schemeClr val="accent1"/>
+          </a:fillRef>
+          <a:effectRef idx="0">
+            <a:schemeClr val="accent1"/>
+          </a:effectRef>
+          <a:fontRef idx="minor">
+            <a:schemeClr val="lt1"/>
+          </a:fontRef>
+        </p:style>
+        <p:txBody>
+          <a:bodyPr rtlCol="0" anchor="ctr"/>
+          <a:lstStyle>
+            <a:defPPr>
+              <a:defRPr lang="en-US"/>
+            </a:defPPr>
+            <a:lvl1pPr algn="ctr">
+              <a:defRPr sz="800">
+                <a:solidFill>
+                  <a:schemeClr val="tx1"/>
+                </a:solidFill>
+                <a:latin typeface="Arial" pitchFamily="34" charset="0"/>
+                <a:cs typeface="Arial" pitchFamily="34" charset="0"/>
+              </a:defRPr>
+            </a:lvl1pPr>
+          </a:lstStyle>
+          <a:p>
+            <a:r>
+              <a:rPr lang="en-US" dirty="0"/>
+              <a:t>WCET Analysis of Run-Time Monitoring</a:t>
+            </a:r>
+          </a:p>
+        </p:txBody>
+      </p:sp>
+      <p:sp>
+        <p:nvSpPr>
+          <p:cNvPr id="13" name="TextBox 12"/>
+          <p:cNvSpPr txBox="1"/>
+          <p:nvPr/>
+        </p:nvSpPr>
+        <p:spPr>
+          <a:xfrm>
+            <a:off x="1166018" y="838150"/>
+            <a:ext cx="1433011" cy="381000"/>
+          </a:xfrm>
+          <a:prstGeom prst="rect">
+            <a:avLst/>
+          </a:prstGeom>
+          <a:solidFill>
+            <a:srgbClr val="FFFFCC"/>
+          </a:solidFill>
+          <a:ln w="12700">
+            <a:solidFill>
+              <a:schemeClr val="tx1"/>
+            </a:solidFill>
+          </a:ln>
+        </p:spPr>
+        <p:style>
+          <a:lnRef idx="2">
+            <a:schemeClr val="accent1">
+              <a:shade val="50000"/>
+            </a:schemeClr>
+          </a:lnRef>
+          <a:fillRef idx="1">
+            <a:schemeClr val="accent1"/>
+          </a:fillRef>
+          <a:effectRef idx="0">
+            <a:schemeClr val="accent1"/>
+          </a:effectRef>
+          <a:fontRef idx="minor">
+            <a:schemeClr val="lt1"/>
+          </a:fontRef>
+        </p:style>
+        <p:txBody>
+          <a:bodyPr rtlCol="0" anchor="ctr"/>
+          <a:lstStyle>
+            <a:defPPr>
+              <a:defRPr lang="en-US"/>
+            </a:defPPr>
+            <a:lvl1pPr algn="ctr">
+              <a:defRPr sz="800">
+                <a:solidFill>
+                  <a:schemeClr val="tx1"/>
+                </a:solidFill>
+                <a:latin typeface="Arial" pitchFamily="34" charset="0"/>
+                <a:cs typeface="Arial" pitchFamily="34" charset="0"/>
+              </a:defRPr>
+            </a:lvl1pPr>
+          </a:lstStyle>
+          <a:p>
+            <a:r>
+              <a:rPr lang="en-US" dirty="0"/>
+              <a:t>Monitoring Architecture for Hard Real-Time Systems</a:t>
+            </a:r>
+          </a:p>
+        </p:txBody>
+      </p:sp>
+      <p:sp>
+        <p:nvSpPr>
+          <p:cNvPr id="14" name="TextBox 13"/>
+          <p:cNvSpPr txBox="1"/>
+          <p:nvPr/>
+        </p:nvSpPr>
+        <p:spPr>
+          <a:xfrm>
+            <a:off x="1173413" y="1746022"/>
+            <a:ext cx="1433011" cy="381000"/>
+          </a:xfrm>
+          <a:prstGeom prst="rect">
+            <a:avLst/>
+          </a:prstGeom>
+          <a:solidFill>
+            <a:srgbClr val="FFFFCC"/>
+          </a:solidFill>
+          <a:ln w="12700">
+            <a:solidFill>
+              <a:schemeClr val="tx1"/>
+            </a:solidFill>
+          </a:ln>
+        </p:spPr>
+        <p:style>
+          <a:lnRef idx="2">
+            <a:schemeClr val="accent1">
+              <a:shade val="50000"/>
+            </a:schemeClr>
+          </a:lnRef>
+          <a:fillRef idx="1">
+            <a:schemeClr val="accent1"/>
+          </a:fillRef>
+          <a:effectRef idx="0">
+            <a:schemeClr val="accent1"/>
+          </a:effectRef>
+          <a:fontRef idx="minor">
+            <a:schemeClr val="lt1"/>
+          </a:fontRef>
+        </p:style>
+        <p:txBody>
+          <a:bodyPr rtlCol="0" anchor="ctr"/>
+          <a:lstStyle>
+            <a:defPPr>
+              <a:defRPr lang="en-US"/>
+            </a:defPPr>
+            <a:lvl1pPr algn="ctr">
+              <a:defRPr sz="800">
+                <a:solidFill>
+                  <a:schemeClr val="tx1"/>
+                </a:solidFill>
+                <a:latin typeface="Arial" pitchFamily="34" charset="0"/>
+                <a:cs typeface="Arial" pitchFamily="34" charset="0"/>
+              </a:defRPr>
+            </a:lvl1pPr>
+          </a:lstStyle>
+          <a:p>
+            <a:r>
+              <a:rPr lang="en-US" dirty="0"/>
+              <a:t>Monitoring Architecture for Soft Real-Time Systems</a:t>
+            </a:r>
+          </a:p>
+        </p:txBody>
+      </p:sp>
+      <p:sp>
+        <p:nvSpPr>
+          <p:cNvPr id="15" name="TextBox 14"/>
+          <p:cNvSpPr txBox="1"/>
+          <p:nvPr/>
+        </p:nvSpPr>
+        <p:spPr>
+          <a:xfrm>
+            <a:off x="3002213" y="1746022"/>
+            <a:ext cx="1433011" cy="381000"/>
+          </a:xfrm>
+          <a:prstGeom prst="rect">
+            <a:avLst/>
+          </a:prstGeom>
+          <a:solidFill>
+            <a:srgbClr val="FFFFCC"/>
+          </a:solidFill>
+          <a:ln w="12700">
+            <a:solidFill>
+              <a:schemeClr val="tx1"/>
+            </a:solidFill>
+          </a:ln>
+        </p:spPr>
+        <p:style>
+          <a:lnRef idx="2">
+            <a:schemeClr val="accent1">
+              <a:shade val="50000"/>
+            </a:schemeClr>
+          </a:lnRef>
+          <a:fillRef idx="1">
+            <a:schemeClr val="accent1"/>
+          </a:fillRef>
+          <a:effectRef idx="0">
+            <a:schemeClr val="accent1"/>
+          </a:effectRef>
+          <a:fontRef idx="minor">
+            <a:schemeClr val="lt1"/>
+          </a:fontRef>
+        </p:style>
+        <p:txBody>
+          <a:bodyPr rtlCol="0" anchor="ctr"/>
+          <a:lstStyle>
+            <a:defPPr>
+              <a:defRPr lang="en-US"/>
+            </a:defPPr>
+            <a:lvl1pPr algn="ctr">
+              <a:defRPr sz="800">
+                <a:solidFill>
+                  <a:schemeClr val="tx1"/>
+                </a:solidFill>
+                <a:latin typeface="Arial" pitchFamily="34" charset="0"/>
+                <a:cs typeface="Arial" pitchFamily="34" charset="0"/>
+              </a:defRPr>
+            </a:lvl1pPr>
+          </a:lstStyle>
+          <a:p>
+            <a:r>
+              <a:rPr lang="en-US" dirty="0"/>
+              <a:t>DVFS Control for Soft Real-Time Systems</a:t>
+            </a:r>
+          </a:p>
+        </p:txBody>
+      </p:sp>
+      <p:sp>
+        <p:nvSpPr>
+          <p:cNvPr id="16" name="Rounded Rectangle 15"/>
+          <p:cNvSpPr/>
+          <p:nvPr/>
+        </p:nvSpPr>
+        <p:spPr>
+          <a:xfrm>
+            <a:off x="594518" y="1434644"/>
+            <a:ext cx="4038601" cy="1003756"/>
+          </a:xfrm>
+          <a:prstGeom prst="roundRect">
+            <a:avLst>
+              <a:gd name="adj" fmla="val 7547"/>
+            </a:avLst>
+          </a:prstGeom>
+          <a:noFill/>
+          <a:ln w="12700">
+            <a:solidFill>
+              <a:schemeClr val="tx1"/>
+            </a:solidFill>
+          </a:ln>
+        </p:spPr>
+        <p:style>
+          <a:lnRef idx="2">
+            <a:schemeClr val="accent1">
+              <a:shade val="50000"/>
+            </a:schemeClr>
+          </a:lnRef>
+          <a:fillRef idx="1">
+            <a:schemeClr val="accent1"/>
+          </a:fillRef>
+          <a:effectRef idx="0">
+            <a:schemeClr val="accent1"/>
+          </a:effectRef>
+          <a:fontRef idx="minor">
+            <a:schemeClr val="lt1"/>
+          </a:fontRef>
+        </p:style>
+        <p:txBody>
+          <a:bodyPr rtlCol="0" anchor="ctr"/>
+          <a:lstStyle/>
+          <a:p>
+            <a:pPr algn="ctr"/>
+            <a:endParaRPr lang="en-US" sz="800" dirty="0">
+              <a:solidFill>
+                <a:schemeClr val="tx1"/>
+              </a:solidFill>
+              <a:latin typeface="Arial" pitchFamily="34" charset="0"/>
+              <a:cs typeface="Arial" pitchFamily="34" charset="0"/>
+            </a:endParaRPr>
+          </a:p>
+        </p:txBody>
+      </p:sp>
+    </p:spTree>
+    <p:extLst>
+      <p:ext uri="{BB962C8B-B14F-4D97-AF65-F5344CB8AC3E}">
+        <p14:creationId xmlns:p14="http://schemas.microsoft.com/office/powerpoint/2010/main" val="3356890285"/>
+      </p:ext>
+    </p:extLst>
+  </p:cSld>
+  <p:clrMapOvr>
+    <a:masterClrMapping/>
+  </p:clrMapOvr>
+</p:sld>
+</file>
+
+<file path=ppt/slides/slide5.xml><?xml version="1.0" encoding="utf-8"?>
+<p:sld xmlns:a="http://schemas.openxmlformats.org/drawingml/2006/main" xmlns:r="http://schemas.openxmlformats.org/officeDocument/2006/relationships" xmlns:p="http://schemas.openxmlformats.org/presentationml/2006/main">
+  <p:cSld>
+    <p:spTree>
+      <p:nvGrpSpPr>
+        <p:cNvPr id="1" name=""/>
+        <p:cNvGrpSpPr/>
+        <p:nvPr/>
+      </p:nvGrpSpPr>
+      <p:grpSpPr>
+        <a:xfrm>
+          <a:off x="0" y="0"/>
+          <a:ext cx="0" cy="0"/>
+          <a:chOff x="0" y="0"/>
+          <a:chExt cx="0" cy="0"/>
+        </a:xfrm>
+      </p:grpSpPr>
+      <p:sp>
+        <p:nvSpPr>
+          <p:cNvPr id="3" name="TextBox 2"/>
+          <p:cNvSpPr txBox="1"/>
+          <p:nvPr/>
+        </p:nvSpPr>
+        <p:spPr>
+          <a:xfrm>
+            <a:off x="1103086" y="76200"/>
+            <a:ext cx="1676400" cy="215444"/>
+          </a:xfrm>
+          <a:prstGeom prst="rect">
+            <a:avLst/>
+          </a:prstGeom>
+          <a:noFill/>
+          <a:ln w="12700">
+            <a:noFill/>
+          </a:ln>
+        </p:spPr>
+        <p:style>
+          <a:lnRef idx="2">
+            <a:schemeClr val="accent1">
+              <a:shade val="50000"/>
+            </a:schemeClr>
+          </a:lnRef>
+          <a:fillRef idx="1">
+            <a:schemeClr val="accent1"/>
+          </a:fillRef>
+          <a:effectRef idx="0">
+            <a:schemeClr val="accent1"/>
+          </a:effectRef>
+          <a:fontRef idx="minor">
+            <a:schemeClr val="lt1"/>
+          </a:fontRef>
+        </p:style>
+        <p:txBody>
+          <a:bodyPr rtlCol="0" anchor="ctr"/>
+          <a:lstStyle>
+            <a:defPPr>
+              <a:defRPr lang="en-US"/>
+            </a:defPPr>
+            <a:lvl1pPr algn="r">
+              <a:defRPr sz="800">
+                <a:latin typeface="Arial" pitchFamily="34" charset="0"/>
+                <a:cs typeface="Arial" pitchFamily="34" charset="0"/>
+              </a:defRPr>
+            </a:lvl1pPr>
+            <a:lvl2pPr>
+              <a:defRPr>
+                <a:solidFill>
+                  <a:schemeClr val="lt1"/>
+                </a:solidFill>
+              </a:defRPr>
+            </a:lvl2pPr>
+            <a:lvl3pPr>
+              <a:defRPr>
+                <a:solidFill>
+                  <a:schemeClr val="lt1"/>
+                </a:solidFill>
+              </a:defRPr>
+            </a:lvl3pPr>
+            <a:lvl4pPr>
+              <a:defRPr>
+                <a:solidFill>
+                  <a:schemeClr val="lt1"/>
+                </a:solidFill>
+              </a:defRPr>
+            </a:lvl4pPr>
+            <a:lvl5pPr>
+              <a:defRPr>
+                <a:solidFill>
+                  <a:schemeClr val="lt1"/>
+                </a:solidFill>
+              </a:defRPr>
+            </a:lvl5pPr>
+            <a:lvl6pPr>
+              <a:defRPr>
+                <a:solidFill>
+                  <a:schemeClr val="lt1"/>
+                </a:solidFill>
+              </a:defRPr>
+            </a:lvl6pPr>
+            <a:lvl7pPr>
+              <a:defRPr>
+                <a:solidFill>
+                  <a:schemeClr val="lt1"/>
+                </a:solidFill>
+              </a:defRPr>
+            </a:lvl7pPr>
+            <a:lvl8pPr>
+              <a:defRPr>
+                <a:solidFill>
+                  <a:schemeClr val="lt1"/>
+                </a:solidFill>
+              </a:defRPr>
+            </a:lvl8pPr>
+            <a:lvl9pPr>
+              <a:defRPr>
+                <a:solidFill>
+                  <a:schemeClr val="lt1"/>
+                </a:solidFill>
+              </a:defRPr>
+            </a:lvl9pPr>
+          </a:lstStyle>
+          <a:p>
+            <a:pPr algn="ctr"/>
+            <a:r>
+              <a:rPr lang="en-US" dirty="0">
+                <a:solidFill>
+                  <a:schemeClr val="tx1"/>
+                </a:solidFill>
+              </a:rPr>
+              <a:t>Security &amp; Reliability</a:t>
+            </a:r>
+          </a:p>
+        </p:txBody>
+      </p:sp>
+      <p:sp>
+        <p:nvSpPr>
+          <p:cNvPr id="5" name="TextBox 4"/>
+          <p:cNvSpPr txBox="1"/>
+          <p:nvPr/>
+        </p:nvSpPr>
+        <p:spPr>
+          <a:xfrm>
+            <a:off x="2931886" y="76200"/>
+            <a:ext cx="1676400" cy="215444"/>
+          </a:xfrm>
+          <a:prstGeom prst="rect">
+            <a:avLst/>
+          </a:prstGeom>
+          <a:noFill/>
+          <a:ln w="12700">
+            <a:noFill/>
+          </a:ln>
+        </p:spPr>
+        <p:style>
+          <a:lnRef idx="2">
+            <a:schemeClr val="accent1">
+              <a:shade val="50000"/>
+            </a:schemeClr>
+          </a:lnRef>
+          <a:fillRef idx="1">
+            <a:schemeClr val="accent1"/>
+          </a:fillRef>
+          <a:effectRef idx="0">
+            <a:schemeClr val="accent1"/>
+          </a:effectRef>
+          <a:fontRef idx="minor">
+            <a:schemeClr val="lt1"/>
+          </a:fontRef>
+        </p:style>
+        <p:txBody>
+          <a:bodyPr rtlCol="0" anchor="ctr"/>
+          <a:lstStyle>
+            <a:defPPr>
+              <a:defRPr lang="en-US"/>
+            </a:defPPr>
+            <a:lvl1pPr algn="r">
+              <a:defRPr sz="800">
+                <a:latin typeface="Arial" pitchFamily="34" charset="0"/>
+                <a:cs typeface="Arial" pitchFamily="34" charset="0"/>
+              </a:defRPr>
+            </a:lvl1pPr>
+            <a:lvl2pPr>
+              <a:defRPr>
+                <a:solidFill>
+                  <a:schemeClr val="lt1"/>
+                </a:solidFill>
+              </a:defRPr>
+            </a:lvl2pPr>
+            <a:lvl3pPr>
+              <a:defRPr>
+                <a:solidFill>
+                  <a:schemeClr val="lt1"/>
+                </a:solidFill>
+              </a:defRPr>
+            </a:lvl3pPr>
+            <a:lvl4pPr>
+              <a:defRPr>
+                <a:solidFill>
+                  <a:schemeClr val="lt1"/>
+                </a:solidFill>
+              </a:defRPr>
+            </a:lvl4pPr>
+            <a:lvl5pPr>
+              <a:defRPr>
+                <a:solidFill>
+                  <a:schemeClr val="lt1"/>
+                </a:solidFill>
+              </a:defRPr>
+            </a:lvl5pPr>
+            <a:lvl6pPr>
+              <a:defRPr>
+                <a:solidFill>
+                  <a:schemeClr val="lt1"/>
+                </a:solidFill>
+              </a:defRPr>
+            </a:lvl6pPr>
+            <a:lvl7pPr>
+              <a:defRPr>
+                <a:solidFill>
+                  <a:schemeClr val="lt1"/>
+                </a:solidFill>
+              </a:defRPr>
+            </a:lvl7pPr>
+            <a:lvl8pPr>
+              <a:defRPr>
+                <a:solidFill>
+                  <a:schemeClr val="lt1"/>
+                </a:solidFill>
+              </a:defRPr>
+            </a:lvl8pPr>
+            <a:lvl9pPr>
+              <a:defRPr>
+                <a:solidFill>
+                  <a:schemeClr val="lt1"/>
+                </a:solidFill>
+              </a:defRPr>
+            </a:lvl9pPr>
+          </a:lstStyle>
+          <a:p>
+            <a:pPr algn="ctr"/>
+            <a:r>
+              <a:rPr lang="en-US" dirty="0" smtClean="0">
+                <a:solidFill>
+                  <a:schemeClr val="tx1"/>
+                </a:solidFill>
+              </a:rPr>
+              <a:t>Energy Efficiency</a:t>
+            </a:r>
+            <a:endParaRPr lang="en-US" dirty="0">
+              <a:solidFill>
+                <a:schemeClr val="tx1"/>
+              </a:solidFill>
+            </a:endParaRPr>
+          </a:p>
+        </p:txBody>
+      </p:sp>
+      <p:sp>
+        <p:nvSpPr>
+          <p:cNvPr id="7" name="TextBox 6"/>
+          <p:cNvSpPr txBox="1"/>
+          <p:nvPr/>
+        </p:nvSpPr>
+        <p:spPr>
+          <a:xfrm rot="16200000">
+            <a:off x="179444" y="758086"/>
+            <a:ext cx="1232356" cy="299472"/>
+          </a:xfrm>
+          <a:prstGeom prst="rect">
+            <a:avLst/>
+          </a:prstGeom>
+          <a:noFill/>
+          <a:ln w="12700">
+            <a:noFill/>
+          </a:ln>
+        </p:spPr>
+        <p:style>
+          <a:lnRef idx="2">
+            <a:schemeClr val="accent1">
+              <a:shade val="50000"/>
+            </a:schemeClr>
+          </a:lnRef>
+          <a:fillRef idx="1">
+            <a:schemeClr val="accent1"/>
+          </a:fillRef>
+          <a:effectRef idx="0">
+            <a:schemeClr val="accent1"/>
+          </a:effectRef>
+          <a:fontRef idx="minor">
+            <a:schemeClr val="lt1"/>
+          </a:fontRef>
+        </p:style>
+        <p:txBody>
+          <a:bodyPr rtlCol="0" anchor="ctr"/>
+          <a:lstStyle>
+            <a:defPPr>
+              <a:defRPr lang="en-US"/>
+            </a:defPPr>
+            <a:lvl1pPr algn="r">
+              <a:defRPr sz="800">
+                <a:latin typeface="Arial" pitchFamily="34" charset="0"/>
+                <a:cs typeface="Arial" pitchFamily="34" charset="0"/>
+              </a:defRPr>
+            </a:lvl1pPr>
+            <a:lvl2pPr>
+              <a:defRPr>
+                <a:solidFill>
+                  <a:schemeClr val="lt1"/>
+                </a:solidFill>
+              </a:defRPr>
+            </a:lvl2pPr>
+            <a:lvl3pPr>
+              <a:defRPr>
+                <a:solidFill>
+                  <a:schemeClr val="lt1"/>
+                </a:solidFill>
+              </a:defRPr>
+            </a:lvl3pPr>
+            <a:lvl4pPr>
+              <a:defRPr>
+                <a:solidFill>
+                  <a:schemeClr val="lt1"/>
+                </a:solidFill>
+              </a:defRPr>
+            </a:lvl4pPr>
+            <a:lvl5pPr>
+              <a:defRPr>
+                <a:solidFill>
+                  <a:schemeClr val="lt1"/>
+                </a:solidFill>
+              </a:defRPr>
+            </a:lvl5pPr>
+            <a:lvl6pPr>
+              <a:defRPr>
+                <a:solidFill>
+                  <a:schemeClr val="lt1"/>
+                </a:solidFill>
+              </a:defRPr>
+            </a:lvl6pPr>
+            <a:lvl7pPr>
+              <a:defRPr>
+                <a:solidFill>
+                  <a:schemeClr val="lt1"/>
+                </a:solidFill>
+              </a:defRPr>
+            </a:lvl7pPr>
+            <a:lvl8pPr>
+              <a:defRPr>
+                <a:solidFill>
+                  <a:schemeClr val="lt1"/>
+                </a:solidFill>
+              </a:defRPr>
+            </a:lvl8pPr>
+            <a:lvl9pPr>
+              <a:defRPr>
+                <a:solidFill>
+                  <a:schemeClr val="lt1"/>
+                </a:solidFill>
+              </a:defRPr>
+            </a:lvl9pPr>
+          </a:lstStyle>
+          <a:p>
+            <a:pPr algn="ctr"/>
+            <a:r>
+              <a:rPr lang="en-US" dirty="0" smtClean="0">
+                <a:solidFill>
+                  <a:schemeClr val="tx1"/>
+                </a:solidFill>
+              </a:rPr>
+              <a:t>Hard Real-Time Systems</a:t>
+            </a:r>
+            <a:endParaRPr lang="en-US" dirty="0">
+              <a:solidFill>
+                <a:schemeClr val="tx1"/>
+              </a:solidFill>
+            </a:endParaRPr>
+          </a:p>
+        </p:txBody>
+      </p:sp>
+      <p:sp>
+        <p:nvSpPr>
+          <p:cNvPr id="8" name="TextBox 7"/>
+          <p:cNvSpPr txBox="1"/>
+          <p:nvPr/>
+        </p:nvSpPr>
+        <p:spPr>
+          <a:xfrm rot="16200000">
+            <a:off x="338425" y="1831463"/>
+            <a:ext cx="914400" cy="299474"/>
+          </a:xfrm>
+          <a:prstGeom prst="rect">
+            <a:avLst/>
+          </a:prstGeom>
+          <a:noFill/>
+          <a:ln w="12700">
+            <a:noFill/>
+          </a:ln>
+        </p:spPr>
+        <p:style>
+          <a:lnRef idx="2">
+            <a:schemeClr val="accent1">
+              <a:shade val="50000"/>
+            </a:schemeClr>
+          </a:lnRef>
+          <a:fillRef idx="1">
+            <a:schemeClr val="accent1"/>
+          </a:fillRef>
+          <a:effectRef idx="0">
+            <a:schemeClr val="accent1"/>
+          </a:effectRef>
+          <a:fontRef idx="minor">
+            <a:schemeClr val="lt1"/>
+          </a:fontRef>
+        </p:style>
+        <p:txBody>
+          <a:bodyPr rtlCol="0" anchor="ctr"/>
+          <a:lstStyle>
+            <a:defPPr>
+              <a:defRPr lang="en-US"/>
+            </a:defPPr>
+            <a:lvl1pPr algn="r">
+              <a:defRPr sz="800">
+                <a:latin typeface="Arial" pitchFamily="34" charset="0"/>
+                <a:cs typeface="Arial" pitchFamily="34" charset="0"/>
+              </a:defRPr>
+            </a:lvl1pPr>
+            <a:lvl2pPr>
+              <a:defRPr>
+                <a:solidFill>
+                  <a:schemeClr val="lt1"/>
+                </a:solidFill>
+              </a:defRPr>
+            </a:lvl2pPr>
+            <a:lvl3pPr>
+              <a:defRPr>
+                <a:solidFill>
+                  <a:schemeClr val="lt1"/>
+                </a:solidFill>
+              </a:defRPr>
+            </a:lvl3pPr>
+            <a:lvl4pPr>
+              <a:defRPr>
+                <a:solidFill>
+                  <a:schemeClr val="lt1"/>
+                </a:solidFill>
+              </a:defRPr>
+            </a:lvl4pPr>
+            <a:lvl5pPr>
+              <a:defRPr>
+                <a:solidFill>
+                  <a:schemeClr val="lt1"/>
+                </a:solidFill>
+              </a:defRPr>
+            </a:lvl5pPr>
+            <a:lvl6pPr>
+              <a:defRPr>
+                <a:solidFill>
+                  <a:schemeClr val="lt1"/>
+                </a:solidFill>
+              </a:defRPr>
+            </a:lvl6pPr>
+            <a:lvl7pPr>
+              <a:defRPr>
+                <a:solidFill>
+                  <a:schemeClr val="lt1"/>
+                </a:solidFill>
+              </a:defRPr>
+            </a:lvl7pPr>
+            <a:lvl8pPr>
+              <a:defRPr>
+                <a:solidFill>
+                  <a:schemeClr val="lt1"/>
+                </a:solidFill>
+              </a:defRPr>
+            </a:lvl8pPr>
+            <a:lvl9pPr>
+              <a:defRPr>
+                <a:solidFill>
+                  <a:schemeClr val="lt1"/>
+                </a:solidFill>
+              </a:defRPr>
+            </a:lvl9pPr>
+          </a:lstStyle>
+          <a:p>
+            <a:pPr algn="ctr"/>
+            <a:r>
+              <a:rPr lang="en-US" dirty="0" smtClean="0">
+                <a:solidFill>
+                  <a:schemeClr val="tx1"/>
+                </a:solidFill>
+              </a:rPr>
+              <a:t>Soft Real-Time Systems</a:t>
+            </a:r>
+            <a:endParaRPr lang="en-US" dirty="0">
+              <a:solidFill>
+                <a:schemeClr val="tx1"/>
+              </a:solidFill>
+            </a:endParaRPr>
+          </a:p>
+        </p:txBody>
+      </p:sp>
+      <p:sp>
+        <p:nvSpPr>
+          <p:cNvPr id="9" name="TextBox 8"/>
+          <p:cNvSpPr txBox="1"/>
+          <p:nvPr/>
+        </p:nvSpPr>
+        <p:spPr>
+          <a:xfrm>
+            <a:off x="1217383" y="386892"/>
+            <a:ext cx="1433011" cy="451257"/>
+          </a:xfrm>
+          <a:prstGeom prst="rect">
+            <a:avLst/>
+          </a:prstGeom>
+          <a:solidFill>
+            <a:srgbClr val="FFFFCC"/>
+          </a:solidFill>
+          <a:ln w="12700">
+            <a:solidFill>
+              <a:schemeClr val="tx1"/>
+            </a:solidFill>
+          </a:ln>
+        </p:spPr>
+        <p:style>
+          <a:lnRef idx="2">
+            <a:schemeClr val="accent1">
+              <a:shade val="50000"/>
+            </a:schemeClr>
+          </a:lnRef>
+          <a:fillRef idx="1">
+            <a:schemeClr val="accent1"/>
+          </a:fillRef>
+          <a:effectRef idx="0">
+            <a:schemeClr val="accent1"/>
+          </a:effectRef>
+          <a:fontRef idx="minor">
+            <a:schemeClr val="lt1"/>
+          </a:fontRef>
+        </p:style>
+        <p:txBody>
+          <a:bodyPr rtlCol="0" anchor="ctr"/>
+          <a:lstStyle>
+            <a:defPPr>
+              <a:defRPr lang="en-US"/>
+            </a:defPPr>
+            <a:lvl1pPr algn="ctr">
+              <a:defRPr sz="800">
+                <a:solidFill>
+                  <a:schemeClr val="tx1"/>
+                </a:solidFill>
+                <a:latin typeface="Arial" pitchFamily="34" charset="0"/>
+                <a:cs typeface="Arial" pitchFamily="34" charset="0"/>
+              </a:defRPr>
+            </a:lvl1pPr>
+          </a:lstStyle>
+          <a:p>
+            <a:r>
+              <a:rPr lang="en-US" dirty="0"/>
+              <a:t>WCET Analysis of Run-Time </a:t>
+            </a:r>
+            <a:r>
+              <a:rPr lang="en-US" dirty="0" smtClean="0"/>
+              <a:t>Monitoring</a:t>
+            </a:r>
+          </a:p>
+          <a:p>
+            <a:r>
+              <a:rPr lang="en-US" dirty="0" smtClean="0"/>
+              <a:t>(Chapter 3)</a:t>
+            </a:r>
+            <a:endParaRPr lang="en-US" dirty="0"/>
+          </a:p>
+        </p:txBody>
+      </p:sp>
+      <p:sp>
+        <p:nvSpPr>
+          <p:cNvPr id="10" name="TextBox 9"/>
+          <p:cNvSpPr txBox="1"/>
+          <p:nvPr/>
+        </p:nvSpPr>
+        <p:spPr>
+          <a:xfrm>
+            <a:off x="1217383" y="962481"/>
+            <a:ext cx="1433012" cy="451257"/>
+          </a:xfrm>
+          <a:prstGeom prst="rect">
+            <a:avLst/>
+          </a:prstGeom>
+          <a:solidFill>
+            <a:srgbClr val="FFFFCC"/>
+          </a:solidFill>
+          <a:ln w="12700">
+            <a:solidFill>
+              <a:schemeClr val="tx1"/>
+            </a:solidFill>
+          </a:ln>
+        </p:spPr>
+        <p:style>
+          <a:lnRef idx="2">
+            <a:schemeClr val="accent1">
+              <a:shade val="50000"/>
+            </a:schemeClr>
+          </a:lnRef>
+          <a:fillRef idx="1">
+            <a:schemeClr val="accent1"/>
+          </a:fillRef>
+          <a:effectRef idx="0">
+            <a:schemeClr val="accent1"/>
+          </a:effectRef>
+          <a:fontRef idx="minor">
+            <a:schemeClr val="lt1"/>
+          </a:fontRef>
+        </p:style>
+        <p:txBody>
+          <a:bodyPr rtlCol="0" anchor="ctr"/>
+          <a:lstStyle>
+            <a:defPPr>
+              <a:defRPr lang="en-US"/>
+            </a:defPPr>
+            <a:lvl1pPr algn="ctr">
+              <a:defRPr sz="800">
+                <a:solidFill>
+                  <a:schemeClr val="tx1"/>
+                </a:solidFill>
+                <a:latin typeface="Arial" pitchFamily="34" charset="0"/>
+                <a:cs typeface="Arial" pitchFamily="34" charset="0"/>
+              </a:defRPr>
+            </a:lvl1pPr>
+          </a:lstStyle>
+          <a:p>
+            <a:r>
+              <a:rPr lang="en-US" dirty="0"/>
+              <a:t>Monitoring Architecture for Hard Real-Time </a:t>
+            </a:r>
+            <a:r>
+              <a:rPr lang="en-US" dirty="0" smtClean="0"/>
+              <a:t>Systems (Chapter 4)</a:t>
+            </a:r>
+            <a:endParaRPr lang="en-US" dirty="0"/>
+          </a:p>
+        </p:txBody>
+      </p:sp>
+      <p:sp>
+        <p:nvSpPr>
+          <p:cNvPr id="11" name="TextBox 10"/>
+          <p:cNvSpPr txBox="1"/>
+          <p:nvPr/>
+        </p:nvSpPr>
+        <p:spPr>
+          <a:xfrm>
+            <a:off x="1217382" y="1755571"/>
+            <a:ext cx="1433011" cy="451257"/>
+          </a:xfrm>
+          <a:prstGeom prst="rect">
+            <a:avLst/>
+          </a:prstGeom>
+          <a:solidFill>
+            <a:srgbClr val="FFFFCC"/>
+          </a:solidFill>
+          <a:ln w="12700">
+            <a:solidFill>
+              <a:schemeClr val="tx1"/>
+            </a:solidFill>
+          </a:ln>
+        </p:spPr>
+        <p:style>
+          <a:lnRef idx="2">
+            <a:schemeClr val="accent1">
+              <a:shade val="50000"/>
+            </a:schemeClr>
+          </a:lnRef>
+          <a:fillRef idx="1">
+            <a:schemeClr val="accent1"/>
+          </a:fillRef>
+          <a:effectRef idx="0">
+            <a:schemeClr val="accent1"/>
+          </a:effectRef>
+          <a:fontRef idx="minor">
+            <a:schemeClr val="lt1"/>
+          </a:fontRef>
+        </p:style>
+        <p:txBody>
+          <a:bodyPr rtlCol="0" anchor="ctr"/>
+          <a:lstStyle>
+            <a:defPPr>
+              <a:defRPr lang="en-US"/>
+            </a:defPPr>
+            <a:lvl1pPr algn="ctr">
+              <a:defRPr sz="800">
+                <a:solidFill>
+                  <a:schemeClr val="tx1"/>
+                </a:solidFill>
+                <a:latin typeface="Arial" pitchFamily="34" charset="0"/>
+                <a:cs typeface="Arial" pitchFamily="34" charset="0"/>
+              </a:defRPr>
+            </a:lvl1pPr>
+          </a:lstStyle>
+          <a:p>
+            <a:r>
+              <a:rPr lang="en-US" dirty="0"/>
+              <a:t>Monitoring Architecture for Soft Real-Time </a:t>
+            </a:r>
+            <a:r>
+              <a:rPr lang="en-US" dirty="0" smtClean="0"/>
+              <a:t>Systems (Chapter 5)</a:t>
+            </a:r>
+            <a:endParaRPr lang="en-US" dirty="0"/>
+          </a:p>
+        </p:txBody>
+      </p:sp>
+      <p:sp>
+        <p:nvSpPr>
+          <p:cNvPr id="12" name="TextBox 11"/>
+          <p:cNvSpPr txBox="1"/>
+          <p:nvPr/>
+        </p:nvSpPr>
+        <p:spPr>
+          <a:xfrm>
+            <a:off x="3053580" y="1755571"/>
+            <a:ext cx="1433011" cy="451257"/>
+          </a:xfrm>
+          <a:prstGeom prst="rect">
+            <a:avLst/>
+          </a:prstGeom>
+          <a:solidFill>
+            <a:srgbClr val="FFFFCC"/>
+          </a:solidFill>
+          <a:ln w="12700">
+            <a:solidFill>
+              <a:schemeClr val="tx1"/>
+            </a:solidFill>
+          </a:ln>
+        </p:spPr>
+        <p:style>
+          <a:lnRef idx="2">
+            <a:schemeClr val="accent1">
+              <a:shade val="50000"/>
+            </a:schemeClr>
+          </a:lnRef>
+          <a:fillRef idx="1">
+            <a:schemeClr val="accent1"/>
+          </a:fillRef>
+          <a:effectRef idx="0">
+            <a:schemeClr val="accent1"/>
+          </a:effectRef>
+          <a:fontRef idx="minor">
+            <a:schemeClr val="lt1"/>
+          </a:fontRef>
+        </p:style>
+        <p:txBody>
+          <a:bodyPr rtlCol="0" anchor="ctr"/>
+          <a:lstStyle>
+            <a:defPPr>
+              <a:defRPr lang="en-US"/>
+            </a:defPPr>
+            <a:lvl1pPr algn="ctr">
+              <a:defRPr sz="800">
+                <a:solidFill>
+                  <a:schemeClr val="tx1"/>
+                </a:solidFill>
+                <a:latin typeface="Arial" pitchFamily="34" charset="0"/>
+                <a:cs typeface="Arial" pitchFamily="34" charset="0"/>
+              </a:defRPr>
+            </a:lvl1pPr>
+          </a:lstStyle>
+          <a:p>
+            <a:r>
+              <a:rPr lang="en-US" dirty="0"/>
+              <a:t>DVFS Control for Soft Real-Time </a:t>
+            </a:r>
+            <a:r>
+              <a:rPr lang="en-US" dirty="0" smtClean="0"/>
+              <a:t>Systems (Chapter 6)</a:t>
+            </a:r>
+            <a:endParaRPr lang="en-US" dirty="0"/>
+          </a:p>
+        </p:txBody>
+      </p:sp>
+      <p:cxnSp>
+        <p:nvCxnSpPr>
+          <p:cNvPr id="14" name="Straight Arrow Connector 13"/>
+          <p:cNvCxnSpPr/>
+          <p:nvPr/>
+        </p:nvCxnSpPr>
+        <p:spPr>
+          <a:xfrm>
+            <a:off x="645885" y="1524000"/>
+            <a:ext cx="4038601" cy="0"/>
+          </a:xfrm>
+          <a:prstGeom prst="straightConnector1">
+            <a:avLst/>
+          </a:prstGeom>
+          <a:ln w="12700">
+            <a:solidFill>
+              <a:schemeClr val="tx1"/>
+            </a:solidFill>
+            <a:headEnd w="sm" len="sm"/>
+            <a:tailEnd type="none" w="med" len="med"/>
+          </a:ln>
+        </p:spPr>
+        <p:style>
+          <a:lnRef idx="1">
+            <a:schemeClr val="accent1"/>
+          </a:lnRef>
+          <a:fillRef idx="0">
+            <a:schemeClr val="accent1"/>
+          </a:fillRef>
+          <a:effectRef idx="0">
+            <a:schemeClr val="accent1"/>
+          </a:effectRef>
+          <a:fontRef idx="minor">
+            <a:schemeClr val="tx1"/>
+          </a:fontRef>
+        </p:style>
+      </p:cxnSp>
+      <p:cxnSp>
+        <p:nvCxnSpPr>
+          <p:cNvPr id="16" name="Straight Arrow Connector 15"/>
+          <p:cNvCxnSpPr/>
+          <p:nvPr/>
+        </p:nvCxnSpPr>
+        <p:spPr>
+          <a:xfrm>
+            <a:off x="645884" y="298605"/>
+            <a:ext cx="4038601" cy="0"/>
+          </a:xfrm>
+          <a:prstGeom prst="straightConnector1">
+            <a:avLst/>
+          </a:prstGeom>
+          <a:ln w="12700">
+            <a:solidFill>
+              <a:schemeClr val="tx1"/>
+            </a:solidFill>
+            <a:headEnd w="sm" len="sm"/>
+            <a:tailEnd type="none" w="med" len="med"/>
+          </a:ln>
+        </p:spPr>
+        <p:style>
+          <a:lnRef idx="1">
+            <a:schemeClr val="accent1"/>
+          </a:lnRef>
+          <a:fillRef idx="0">
+            <a:schemeClr val="accent1"/>
+          </a:fillRef>
+          <a:effectRef idx="0">
+            <a:schemeClr val="accent1"/>
+          </a:effectRef>
+          <a:fontRef idx="minor">
+            <a:schemeClr val="tx1"/>
+          </a:fontRef>
+        </p:style>
+      </p:cxnSp>
+      <p:cxnSp>
+        <p:nvCxnSpPr>
+          <p:cNvPr id="17" name="Straight Arrow Connector 16"/>
+          <p:cNvCxnSpPr/>
+          <p:nvPr/>
+        </p:nvCxnSpPr>
+        <p:spPr>
+          <a:xfrm>
+            <a:off x="2817585" y="76200"/>
+            <a:ext cx="0" cy="2362200"/>
+          </a:xfrm>
+          <a:prstGeom prst="straightConnector1">
+            <a:avLst/>
+          </a:prstGeom>
+          <a:ln w="12700">
+            <a:solidFill>
+              <a:schemeClr val="tx1"/>
+            </a:solidFill>
+            <a:headEnd w="sm" len="sm"/>
+            <a:tailEnd type="none" w="med" len="med"/>
+          </a:ln>
+        </p:spPr>
+        <p:style>
+          <a:lnRef idx="1">
+            <a:schemeClr val="accent1"/>
+          </a:lnRef>
+          <a:fillRef idx="0">
+            <a:schemeClr val="accent1"/>
+          </a:fillRef>
+          <a:effectRef idx="0">
+            <a:schemeClr val="accent1"/>
+          </a:effectRef>
+          <a:fontRef idx="minor">
+            <a:schemeClr val="tx1"/>
+          </a:fontRef>
+        </p:style>
+      </p:cxnSp>
+      <p:cxnSp>
+        <p:nvCxnSpPr>
+          <p:cNvPr id="20" name="Straight Arrow Connector 19"/>
+          <p:cNvCxnSpPr/>
+          <p:nvPr/>
+        </p:nvCxnSpPr>
+        <p:spPr>
+          <a:xfrm>
+            <a:off x="1026886" y="76200"/>
+            <a:ext cx="0" cy="2362200"/>
+          </a:xfrm>
+          <a:prstGeom prst="straightConnector1">
+            <a:avLst/>
+          </a:prstGeom>
+          <a:ln w="12700">
+            <a:solidFill>
+              <a:schemeClr val="tx1"/>
+            </a:solidFill>
+            <a:headEnd w="sm" len="sm"/>
+            <a:tailEnd type="none" w="med" len="med"/>
+          </a:ln>
+        </p:spPr>
+        <p:style>
+          <a:lnRef idx="1">
+            <a:schemeClr val="accent1"/>
+          </a:lnRef>
+          <a:fillRef idx="0">
+            <a:schemeClr val="accent1"/>
+          </a:fillRef>
+          <a:effectRef idx="0">
+            <a:schemeClr val="accent1"/>
+          </a:effectRef>
+          <a:fontRef idx="minor">
+            <a:schemeClr val="tx1"/>
+          </a:fontRef>
+        </p:style>
+      </p:cxnSp>
+      <p:cxnSp>
+        <p:nvCxnSpPr>
+          <p:cNvPr id="21" name="Straight Arrow Connector 20"/>
+          <p:cNvCxnSpPr/>
+          <p:nvPr/>
+        </p:nvCxnSpPr>
+        <p:spPr>
+          <a:xfrm>
+            <a:off x="645889" y="2438400"/>
+            <a:ext cx="4038597" cy="0"/>
+          </a:xfrm>
+          <a:prstGeom prst="straightConnector1">
+            <a:avLst/>
+          </a:prstGeom>
+          <a:ln w="12700">
+            <a:solidFill>
+              <a:schemeClr val="tx1"/>
+            </a:solidFill>
+            <a:headEnd w="sm" len="sm"/>
+            <a:tailEnd type="none" w="med" len="med"/>
+          </a:ln>
+        </p:spPr>
+        <p:style>
+          <a:lnRef idx="1">
+            <a:schemeClr val="accent1"/>
+          </a:lnRef>
+          <a:fillRef idx="0">
+            <a:schemeClr val="accent1"/>
+          </a:fillRef>
+          <a:effectRef idx="0">
+            <a:schemeClr val="accent1"/>
+          </a:effectRef>
+          <a:fontRef idx="minor">
+            <a:schemeClr val="tx1"/>
+          </a:fontRef>
+        </p:style>
+      </p:cxnSp>
+      <p:cxnSp>
+        <p:nvCxnSpPr>
+          <p:cNvPr id="24" name="Straight Arrow Connector 23"/>
+          <p:cNvCxnSpPr/>
+          <p:nvPr/>
+        </p:nvCxnSpPr>
+        <p:spPr>
+          <a:xfrm>
+            <a:off x="4684486" y="76200"/>
+            <a:ext cx="0" cy="2362200"/>
+          </a:xfrm>
+          <a:prstGeom prst="straightConnector1">
+            <a:avLst/>
+          </a:prstGeom>
+          <a:ln w="12700">
+            <a:solidFill>
+              <a:schemeClr val="tx1"/>
+            </a:solidFill>
+            <a:headEnd w="sm" len="sm"/>
+            <a:tailEnd type="none" w="med" len="med"/>
+          </a:ln>
+        </p:spPr>
+        <p:style>
+          <a:lnRef idx="1">
+            <a:schemeClr val="accent1"/>
+          </a:lnRef>
+          <a:fillRef idx="0">
+            <a:schemeClr val="accent1"/>
+          </a:fillRef>
+          <a:effectRef idx="0">
+            <a:schemeClr val="accent1"/>
+          </a:effectRef>
+          <a:fontRef idx="minor">
+            <a:schemeClr val="tx1"/>
+          </a:fontRef>
+        </p:style>
+      </p:cxnSp>
+    </p:spTree>
+    <p:extLst>
+      <p:ext uri="{BB962C8B-B14F-4D97-AF65-F5344CB8AC3E}">
+        <p14:creationId xmlns:p14="http://schemas.microsoft.com/office/powerpoint/2010/main" val="2354021637"/>
       </p:ext>
     </p:extLst>
   </p:cSld>

</xml_diff>

<commit_message>
[monitoring_dift_drop] Change from monitor to monitoring core + various edits.
</commit_message>
<xml_diff>
--- a/figs_src/diagrams-wide.pptx
+++ b/figs_src/diagrams-wide.pptx
@@ -292,7 +292,7 @@
           <a:p>
             <a:fld id="{D9DE92D4-3454-4E80-9822-1258D18FA6E8}" type="datetimeFigureOut">
               <a:rPr lang="en-US" smtClean="0"/>
-              <a:t>7/23/2015</a:t>
+              <a:t>8/3/2015</a:t>
             </a:fld>
             <a:endParaRPr lang="en-US"/>
           </a:p>
@@ -462,7 +462,7 @@
           <a:p>
             <a:fld id="{D9DE92D4-3454-4E80-9822-1258D18FA6E8}" type="datetimeFigureOut">
               <a:rPr lang="en-US" smtClean="0"/>
-              <a:t>7/23/2015</a:t>
+              <a:t>8/3/2015</a:t>
             </a:fld>
             <a:endParaRPr lang="en-US"/>
           </a:p>
@@ -642,7 +642,7 @@
           <a:p>
             <a:fld id="{D9DE92D4-3454-4E80-9822-1258D18FA6E8}" type="datetimeFigureOut">
               <a:rPr lang="en-US" smtClean="0"/>
-              <a:t>7/23/2015</a:t>
+              <a:t>8/3/2015</a:t>
             </a:fld>
             <a:endParaRPr lang="en-US"/>
           </a:p>
@@ -812,7 +812,7 @@
           <a:p>
             <a:fld id="{D9DE92D4-3454-4E80-9822-1258D18FA6E8}" type="datetimeFigureOut">
               <a:rPr lang="en-US" smtClean="0"/>
-              <a:t>7/23/2015</a:t>
+              <a:t>8/3/2015</a:t>
             </a:fld>
             <a:endParaRPr lang="en-US"/>
           </a:p>
@@ -1058,7 +1058,7 @@
           <a:p>
             <a:fld id="{D9DE92D4-3454-4E80-9822-1258D18FA6E8}" type="datetimeFigureOut">
               <a:rPr lang="en-US" smtClean="0"/>
-              <a:t>7/23/2015</a:t>
+              <a:t>8/3/2015</a:t>
             </a:fld>
             <a:endParaRPr lang="en-US"/>
           </a:p>
@@ -1346,7 +1346,7 @@
           <a:p>
             <a:fld id="{D9DE92D4-3454-4E80-9822-1258D18FA6E8}" type="datetimeFigureOut">
               <a:rPr lang="en-US" smtClean="0"/>
-              <a:t>7/23/2015</a:t>
+              <a:t>8/3/2015</a:t>
             </a:fld>
             <a:endParaRPr lang="en-US"/>
           </a:p>
@@ -1773,7 +1773,7 @@
           <a:p>
             <a:fld id="{D9DE92D4-3454-4E80-9822-1258D18FA6E8}" type="datetimeFigureOut">
               <a:rPr lang="en-US" smtClean="0"/>
-              <a:t>7/23/2015</a:t>
+              <a:t>8/3/2015</a:t>
             </a:fld>
             <a:endParaRPr lang="en-US"/>
           </a:p>
@@ -1891,7 +1891,7 @@
           <a:p>
             <a:fld id="{D9DE92D4-3454-4E80-9822-1258D18FA6E8}" type="datetimeFigureOut">
               <a:rPr lang="en-US" smtClean="0"/>
-              <a:t>7/23/2015</a:t>
+              <a:t>8/3/2015</a:t>
             </a:fld>
             <a:endParaRPr lang="en-US"/>
           </a:p>
@@ -1986,7 +1986,7 @@
           <a:p>
             <a:fld id="{D9DE92D4-3454-4E80-9822-1258D18FA6E8}" type="datetimeFigureOut">
               <a:rPr lang="en-US" smtClean="0"/>
-              <a:t>7/23/2015</a:t>
+              <a:t>8/3/2015</a:t>
             </a:fld>
             <a:endParaRPr lang="en-US"/>
           </a:p>
@@ -2263,7 +2263,7 @@
           <a:p>
             <a:fld id="{D9DE92D4-3454-4E80-9822-1258D18FA6E8}" type="datetimeFigureOut">
               <a:rPr lang="en-US" smtClean="0"/>
-              <a:t>7/23/2015</a:t>
+              <a:t>8/3/2015</a:t>
             </a:fld>
             <a:endParaRPr lang="en-US"/>
           </a:p>
@@ -2516,7 +2516,7 @@
           <a:p>
             <a:fld id="{D9DE92D4-3454-4E80-9822-1258D18FA6E8}" type="datetimeFigureOut">
               <a:rPr lang="en-US" smtClean="0"/>
-              <a:t>7/23/2015</a:t>
+              <a:t>8/3/2015</a:t>
             </a:fld>
             <a:endParaRPr lang="en-US"/>
           </a:p>
@@ -2729,7 +2729,7 @@
           <a:p>
             <a:fld id="{D9DE92D4-3454-4E80-9822-1258D18FA6E8}" type="datetimeFigureOut">
               <a:rPr lang="en-US" smtClean="0"/>
-              <a:t>7/23/2015</a:t>
+              <a:t>8/3/2015</a:t>
             </a:fld>
             <a:endParaRPr lang="en-US"/>
           </a:p>
@@ -6092,11 +6092,11 @@
           <a:p>
             <a:pPr algn="ctr"/>
             <a:r>
-              <a:rPr lang="en-US" sz="800" dirty="0" smtClean="0">
+              <a:rPr lang="en-US" sz="800" smtClean="0">
                 <a:latin typeface="Arial" pitchFamily="34" charset="0"/>
                 <a:cs typeface="Arial" pitchFamily="34" charset="0"/>
               </a:rPr>
-              <a:t>Monitor</a:t>
+              <a:t>Monitoring Core</a:t>
             </a:r>
             <a:endParaRPr lang="en-US" sz="800" dirty="0">
               <a:latin typeface="Arial" pitchFamily="34" charset="0"/>

</xml_diff>